<commit_message>
Agrego las transiciones en la presentación
</commit_message>
<xml_diff>
--- a/Presentación - Multi Client.pptx
+++ b/Presentación - Multi Client.pptx
@@ -3436,6 +3436,18 @@
   <p:clrMapOvr>
     <a:masterClrMapping/>
   </p:clrMapOvr>
+  <mc:AlternateContent xmlns:mc="http://schemas.openxmlformats.org/markup-compatibility/2006">
+    <mc:Choice xmlns:p14="http://schemas.microsoft.com/office/powerpoint/2010/main" Requires="p14">
+      <p:transition spd="med" p14:dur="700">
+        <p:fade/>
+      </p:transition>
+    </mc:Choice>
+    <mc:Fallback>
+      <p:transition spd="med">
+        <p:fade/>
+      </p:transition>
+    </mc:Fallback>
+  </mc:AlternateContent>
 </p:sld>
 </file>
 
@@ -3738,6 +3750,18 @@
   <p:clrMapOvr>
     <a:masterClrMapping/>
   </p:clrMapOvr>
+  <mc:AlternateContent xmlns:mc="http://schemas.openxmlformats.org/markup-compatibility/2006">
+    <mc:Choice xmlns:p14="http://schemas.microsoft.com/office/powerpoint/2010/main" Requires="p14">
+      <p:transition spd="med" p14:dur="700">
+        <p:fade/>
+      </p:transition>
+    </mc:Choice>
+    <mc:Fallback>
+      <p:transition spd="med">
+        <p:fade/>
+      </p:transition>
+    </mc:Fallback>
+  </mc:AlternateContent>
 </p:sld>
 </file>
 
@@ -4086,6 +4110,18 @@
   <p:clrMapOvr>
     <a:masterClrMapping/>
   </p:clrMapOvr>
+  <mc:AlternateContent xmlns:mc="http://schemas.openxmlformats.org/markup-compatibility/2006">
+    <mc:Choice xmlns:p14="http://schemas.microsoft.com/office/powerpoint/2010/main" Requires="p14">
+      <p:transition spd="med" p14:dur="700">
+        <p:fade/>
+      </p:transition>
+    </mc:Choice>
+    <mc:Fallback>
+      <p:transition spd="med">
+        <p:fade/>
+      </p:transition>
+    </mc:Fallback>
+  </mc:AlternateContent>
 </p:sld>
 </file>
 
@@ -4485,6 +4521,18 @@
   <p:clrMapOvr>
     <a:masterClrMapping/>
   </p:clrMapOvr>
+  <mc:AlternateContent xmlns:mc="http://schemas.openxmlformats.org/markup-compatibility/2006">
+    <mc:Choice xmlns:p14="http://schemas.microsoft.com/office/powerpoint/2010/main" Requires="p14">
+      <p:transition spd="med" p14:dur="700">
+        <p:fade/>
+      </p:transition>
+    </mc:Choice>
+    <mc:Fallback>
+      <p:transition spd="med">
+        <p:fade/>
+      </p:transition>
+    </mc:Fallback>
+  </mc:AlternateContent>
 </p:sld>
 </file>
 
@@ -4703,6 +4751,18 @@
   <p:clrMapOvr>
     <a:masterClrMapping/>
   </p:clrMapOvr>
+  <mc:AlternateContent xmlns:mc="http://schemas.openxmlformats.org/markup-compatibility/2006">
+    <mc:Choice xmlns:p14="http://schemas.microsoft.com/office/powerpoint/2010/main" Requires="p14">
+      <p:transition spd="med" p14:dur="700">
+        <p:fade/>
+      </p:transition>
+    </mc:Choice>
+    <mc:Fallback>
+      <p:transition spd="med">
+        <p:fade/>
+      </p:transition>
+    </mc:Fallback>
+  </mc:AlternateContent>
 </p:sld>
 </file>
 
@@ -5123,6 +5183,18 @@
   <p:clrMapOvr>
     <a:masterClrMapping/>
   </p:clrMapOvr>
+  <mc:AlternateContent xmlns:mc="http://schemas.openxmlformats.org/markup-compatibility/2006">
+    <mc:Choice xmlns:p14="http://schemas.microsoft.com/office/powerpoint/2010/main" Requires="p14">
+      <p:transition spd="med" p14:dur="700">
+        <p:fade/>
+      </p:transition>
+    </mc:Choice>
+    <mc:Fallback>
+      <p:transition spd="med">
+        <p:fade/>
+      </p:transition>
+    </mc:Fallback>
+  </mc:AlternateContent>
 </p:sld>
 </file>
 

</xml_diff>

<commit_message>
Finalización de la documentación para la entrega Multi Client
</commit_message>
<xml_diff>
--- a/Presentación - Multi Client.pptx
+++ b/Presentación - Multi Client.pptx
@@ -307,7 +307,7 @@
           <a:p>
             <a:fld id="{5BCAD085-E8A6-8845-BD4E-CB4CCA059FC4}" type="datetimeFigureOut">
               <a:rPr lang="en-US" smtClean="0"/>
-              <a:t>10/11/2025</a:t>
+              <a:t>10/16/2025</a:t>
             </a:fld>
             <a:endParaRPr lang="en-US"/>
           </a:p>
@@ -475,7 +475,7 @@
           <a:p>
             <a:fld id="{5BCAD085-E8A6-8845-BD4E-CB4CCA059FC4}" type="datetimeFigureOut">
               <a:rPr lang="en-US" smtClean="0"/>
-              <a:t>10/11/2025</a:t>
+              <a:t>10/16/2025</a:t>
             </a:fld>
             <a:endParaRPr lang="en-US"/>
           </a:p>
@@ -653,7 +653,7 @@
           <a:p>
             <a:fld id="{5BCAD085-E8A6-8845-BD4E-CB4CCA059FC4}" type="datetimeFigureOut">
               <a:rPr lang="en-US" smtClean="0"/>
-              <a:t>10/11/2025</a:t>
+              <a:t>10/16/2025</a:t>
             </a:fld>
             <a:endParaRPr lang="en-US"/>
           </a:p>
@@ -821,7 +821,7 @@
           <a:p>
             <a:fld id="{5BCAD085-E8A6-8845-BD4E-CB4CCA059FC4}" type="datetimeFigureOut">
               <a:rPr lang="en-US" smtClean="0"/>
-              <a:t>10/11/2025</a:t>
+              <a:t>10/16/2025</a:t>
             </a:fld>
             <a:endParaRPr lang="en-US"/>
           </a:p>
@@ -1066,7 +1066,7 @@
           <a:p>
             <a:fld id="{5BCAD085-E8A6-8845-BD4E-CB4CCA059FC4}" type="datetimeFigureOut">
               <a:rPr lang="en-US" smtClean="0"/>
-              <a:t>10/11/2025</a:t>
+              <a:t>10/16/2025</a:t>
             </a:fld>
             <a:endParaRPr lang="en-US"/>
           </a:p>
@@ -1351,7 +1351,7 @@
           <a:p>
             <a:fld id="{5BCAD085-E8A6-8845-BD4E-CB4CCA059FC4}" type="datetimeFigureOut">
               <a:rPr lang="en-US" smtClean="0"/>
-              <a:t>10/11/2025</a:t>
+              <a:t>10/16/2025</a:t>
             </a:fld>
             <a:endParaRPr lang="en-US"/>
           </a:p>
@@ -1770,7 +1770,7 @@
           <a:p>
             <a:fld id="{5BCAD085-E8A6-8845-BD4E-CB4CCA059FC4}" type="datetimeFigureOut">
               <a:rPr lang="en-US" smtClean="0"/>
-              <a:t>10/11/2025</a:t>
+              <a:t>10/16/2025</a:t>
             </a:fld>
             <a:endParaRPr lang="en-US"/>
           </a:p>
@@ -1887,7 +1887,7 @@
           <a:p>
             <a:fld id="{5BCAD085-E8A6-8845-BD4E-CB4CCA059FC4}" type="datetimeFigureOut">
               <a:rPr lang="en-US" smtClean="0"/>
-              <a:t>10/11/2025</a:t>
+              <a:t>10/16/2025</a:t>
             </a:fld>
             <a:endParaRPr lang="en-US"/>
           </a:p>
@@ -1982,7 +1982,7 @@
           <a:p>
             <a:fld id="{5BCAD085-E8A6-8845-BD4E-CB4CCA059FC4}" type="datetimeFigureOut">
               <a:rPr lang="en-US" smtClean="0"/>
-              <a:t>10/11/2025</a:t>
+              <a:t>10/16/2025</a:t>
             </a:fld>
             <a:endParaRPr lang="en-US"/>
           </a:p>
@@ -2257,7 +2257,7 @@
           <a:p>
             <a:fld id="{5BCAD085-E8A6-8845-BD4E-CB4CCA059FC4}" type="datetimeFigureOut">
               <a:rPr lang="en-US" smtClean="0"/>
-              <a:t>10/11/2025</a:t>
+              <a:t>10/16/2025</a:t>
             </a:fld>
             <a:endParaRPr lang="en-US"/>
           </a:p>
@@ -2509,7 +2509,7 @@
           <a:p>
             <a:fld id="{5BCAD085-E8A6-8845-BD4E-CB4CCA059FC4}" type="datetimeFigureOut">
               <a:rPr lang="en-US" smtClean="0"/>
-              <a:t>10/11/2025</a:t>
+              <a:t>10/16/2025</a:t>
             </a:fld>
             <a:endParaRPr lang="en-US"/>
           </a:p>
@@ -2720,7 +2720,7 @@
           <a:p>
             <a:fld id="{5BCAD085-E8A6-8845-BD4E-CB4CCA059FC4}" type="datetimeFigureOut">
               <a:rPr lang="en-US" smtClean="0"/>
-              <a:t>10/11/2025</a:t>
+              <a:t>10/16/2025</a:t>
             </a:fld>
             <a:endParaRPr lang="en-US"/>
           </a:p>
@@ -3436,13 +3436,13 @@
   <p:clrMapOvr>
     <a:masterClrMapping/>
   </p:clrMapOvr>
-  <mc:AlternateContent xmlns:mc="http://schemas.openxmlformats.org/markup-compatibility/2006">
-    <mc:Choice xmlns:p14="http://schemas.microsoft.com/office/powerpoint/2010/main" Requires="p14">
+  <mc:AlternateContent xmlns:mc="http://schemas.openxmlformats.org/markup-compatibility/2006" xmlns:p14="http://schemas.microsoft.com/office/powerpoint/2010/main">
+    <mc:Choice Requires="p14">
       <p:transition spd="med" p14:dur="700">
         <p:fade/>
       </p:transition>
     </mc:Choice>
-    <mc:Fallback>
+    <mc:Fallback xmlns="">
       <p:transition spd="med">
         <p:fade/>
       </p:transition>
@@ -3637,6 +3637,30 @@
             </a:r>
           </a:p>
           <a:p>
+            <a:pPr algn="l"/>
+            <a:endParaRPr lang="es-ES" sz="2400" dirty="0">
+              <a:solidFill>
+                <a:srgbClr val="000000"/>
+              </a:solidFill>
+              <a:latin typeface="Nirmala UI Semilight"/>
+            </a:endParaRPr>
+          </a:p>
+          <a:p>
+            <a:pPr marL="342900" indent="-342900" algn="l">
+              <a:buFont typeface="Arial" panose="020B0604020202020204" pitchFamily="34" charset="0"/>
+              <a:buChar char="•"/>
+            </a:pPr>
+            <a:r>
+              <a:rPr lang="es-ES" sz="2400" dirty="0">
+                <a:solidFill>
+                  <a:srgbClr val="000000"/>
+                </a:solidFill>
+                <a:latin typeface="Nirmala UI Semilight"/>
+              </a:rPr>
+              <a:t>Se facilitó enormemente la configuración de la topología (cantidad de nodos de cada controlador).</a:t>
+            </a:r>
+          </a:p>
+          <a:p>
             <a:pPr marL="285750" indent="-285750" algn="l">
               <a:buFont typeface="Arial" panose="020B0604020202020204" pitchFamily="34" charset="0"/>
               <a:buChar char="•"/>
@@ -3750,13 +3774,13 @@
   <p:clrMapOvr>
     <a:masterClrMapping/>
   </p:clrMapOvr>
-  <mc:AlternateContent xmlns:mc="http://schemas.openxmlformats.org/markup-compatibility/2006">
-    <mc:Choice xmlns:p14="http://schemas.microsoft.com/office/powerpoint/2010/main" Requires="p14">
+  <mc:AlternateContent xmlns:mc="http://schemas.openxmlformats.org/markup-compatibility/2006" xmlns:p14="http://schemas.microsoft.com/office/powerpoint/2010/main">
+    <mc:Choice Requires="p14">
       <p:transition spd="med" p14:dur="700">
         <p:fade/>
       </p:transition>
     </mc:Choice>
-    <mc:Fallback>
+    <mc:Fallback xmlns="">
       <p:transition spd="med">
         <p:fade/>
       </p:transition>
@@ -3861,8 +3885,8 @@
         </p:nvSpPr>
         <p:spPr>
           <a:xfrm>
-            <a:off x="685800" y="2265891"/>
-            <a:ext cx="7772400" cy="4185709"/>
+            <a:off x="516636" y="2264070"/>
+            <a:ext cx="8110728" cy="4185709"/>
           </a:xfrm>
         </p:spPr>
         <p:txBody>
@@ -3972,7 +3996,7 @@
                 </a:solidFill>
                 <a:latin typeface="Nirmala UI Semilight"/>
               </a:rPr>
-              <a:t>Propagación de ‘EOF’.</a:t>
+              <a:t>Middleware.</a:t>
             </a:r>
           </a:p>
           <a:p>
@@ -3987,6 +4011,21 @@
                 </a:solidFill>
                 <a:latin typeface="Nirmala UI Semilight"/>
               </a:rPr>
+              <a:t>Rendimiento</a:t>
+            </a:r>
+          </a:p>
+          <a:p>
+            <a:pPr marL="742950" lvl="1" indent="-285750" algn="l">
+              <a:buFont typeface="Arial" panose="020B0604020202020204" pitchFamily="34" charset="0"/>
+              <a:buChar char="•"/>
+            </a:pPr>
+            <a:r>
+              <a:rPr lang="es-ES" sz="2000" dirty="0">
+                <a:solidFill>
+                  <a:srgbClr val="000000"/>
+                </a:solidFill>
+                <a:latin typeface="Nirmala UI Semilight"/>
+              </a:rPr>
               <a:t>Creación de la sección ‘</a:t>
             </a:r>
             <a:r>
@@ -4006,6 +4045,21 @@
                 <a:latin typeface="Nirmala UI Semilight"/>
               </a:rPr>
               <a:t>’.</a:t>
+            </a:r>
+          </a:p>
+          <a:p>
+            <a:pPr marL="742950" lvl="1" indent="-285750" algn="l">
+              <a:buFont typeface="Arial" panose="020B0604020202020204" pitchFamily="34" charset="0"/>
+              <a:buChar char="•"/>
+            </a:pPr>
+            <a:r>
+              <a:rPr lang="es-ES" sz="2000" dirty="0">
+                <a:solidFill>
+                  <a:srgbClr val="000000"/>
+                </a:solidFill>
+                <a:latin typeface="Nirmala UI Semilight"/>
+              </a:rPr>
+              <a:t>Creación de la sección ‘Desafíos al escalar el sistema distribuido’.</a:t>
             </a:r>
           </a:p>
         </p:txBody>
@@ -4110,13 +4164,13 @@
   <p:clrMapOvr>
     <a:masterClrMapping/>
   </p:clrMapOvr>
-  <mc:AlternateContent xmlns:mc="http://schemas.openxmlformats.org/markup-compatibility/2006">
-    <mc:Choice xmlns:p14="http://schemas.microsoft.com/office/powerpoint/2010/main" Requires="p14">
+  <mc:AlternateContent xmlns:mc="http://schemas.openxmlformats.org/markup-compatibility/2006" xmlns:p14="http://schemas.microsoft.com/office/powerpoint/2010/main">
+    <mc:Choice Requires="p14">
       <p:transition spd="med" p14:dur="700">
         <p:fade/>
       </p:transition>
     </mc:Choice>
-    <mc:Fallback>
+    <mc:Fallback xmlns="">
       <p:transition spd="med">
         <p:fade/>
       </p:transition>
@@ -4401,7 +4455,7 @@
                 </a:solidFill>
                 <a:latin typeface="Nirmala UI Semilight"/>
               </a:rPr>
-              <a:t>’.</a:t>
+              <a:t>’ y un script.</a:t>
             </a:r>
           </a:p>
           <a:p>
@@ -4521,13 +4575,13 @@
   <p:clrMapOvr>
     <a:masterClrMapping/>
   </p:clrMapOvr>
-  <mc:AlternateContent xmlns:mc="http://schemas.openxmlformats.org/markup-compatibility/2006">
-    <mc:Choice xmlns:p14="http://schemas.microsoft.com/office/powerpoint/2010/main" Requires="p14">
+  <mc:AlternateContent xmlns:mc="http://schemas.openxmlformats.org/markup-compatibility/2006" xmlns:p14="http://schemas.microsoft.com/office/powerpoint/2010/main">
+    <mc:Choice Requires="p14">
       <p:transition spd="med" p14:dur="700">
         <p:fade/>
       </p:transition>
     </mc:Choice>
-    <mc:Fallback>
+    <mc:Fallback xmlns="">
       <p:transition spd="med">
         <p:fade/>
       </p:transition>
@@ -4751,13 +4805,13 @@
   <p:clrMapOvr>
     <a:masterClrMapping/>
   </p:clrMapOvr>
-  <mc:AlternateContent xmlns:mc="http://schemas.openxmlformats.org/markup-compatibility/2006">
-    <mc:Choice xmlns:p14="http://schemas.microsoft.com/office/powerpoint/2010/main" Requires="p14">
+  <mc:AlternateContent xmlns:mc="http://schemas.openxmlformats.org/markup-compatibility/2006" xmlns:p14="http://schemas.microsoft.com/office/powerpoint/2010/main">
+    <mc:Choice Requires="p14">
       <p:transition spd="med" p14:dur="700">
         <p:fade/>
       </p:transition>
     </mc:Choice>
-    <mc:Fallback>
+    <mc:Fallback xmlns="">
       <p:transition spd="med">
         <p:fade/>
       </p:transition>
@@ -5183,13 +5237,13 @@
   <p:clrMapOvr>
     <a:masterClrMapping/>
   </p:clrMapOvr>
-  <mc:AlternateContent xmlns:mc="http://schemas.openxmlformats.org/markup-compatibility/2006">
-    <mc:Choice xmlns:p14="http://schemas.microsoft.com/office/powerpoint/2010/main" Requires="p14">
+  <mc:AlternateContent xmlns:mc="http://schemas.openxmlformats.org/markup-compatibility/2006" xmlns:p14="http://schemas.microsoft.com/office/powerpoint/2010/main">
+    <mc:Choice Requires="p14">
       <p:transition spd="med" p14:dur="700">
         <p:fade/>
       </p:transition>
     </mc:Choice>
-    <mc:Fallback>
+    <mc:Fallback xmlns="">
       <p:transition spd="med">
         <p:fade/>
       </p:transition>

</xml_diff>